<commit_message>
changed names in boxplot
</commit_message>
<xml_diff>
--- a/Validation project/Report/qPCR-Validation.pptx
+++ b/Validation project/Report/qPCR-Validation.pptx
@@ -5,7 +5,7 @@
     <p:sldMasterId id="2147483930" r:id="rId1"/>
   </p:sldMasterIdLst>
   <p:notesMasterIdLst>
-    <p:notesMasterId r:id="rId10"/>
+    <p:notesMasterId r:id="rId12"/>
   </p:notesMasterIdLst>
   <p:sldIdLst>
     <p:sldId id="258" r:id="rId2"/>
@@ -16,6 +16,8 @@
     <p:sldId id="263" r:id="rId7"/>
     <p:sldId id="262" r:id="rId8"/>
     <p:sldId id="264" r:id="rId9"/>
+    <p:sldId id="265" r:id="rId10"/>
+    <p:sldId id="267" r:id="rId11"/>
   </p:sldIdLst>
   <p:sldSz cx="12192000" cy="6858000"/>
   <p:notesSz cx="6858000" cy="9144000"/>
@@ -216,7 +218,7 @@
           <a:p>
             <a:fld id="{287CCA41-0093-4BFB-A007-59DCDBD5B21F}" type="datetimeFigureOut">
               <a:rPr lang="en-US" smtClean="0"/>
-              <a:t>12/13/2020</a:t>
+              <a:t>3/31/2021</a:t>
             </a:fld>
             <a:endParaRPr lang="en-US"/>
           </a:p>
@@ -875,7 +877,7 @@
           <a:p>
             <a:fld id="{D3E71BF4-18BE-4437-9EA8-9E1F8EFE1093}" type="datetimeFigureOut">
               <a:rPr lang="en-US" smtClean="0"/>
-              <a:t>12/13/2020</a:t>
+              <a:t>3/31/2021</a:t>
             </a:fld>
             <a:endParaRPr lang="en-US"/>
           </a:p>
@@ -1045,7 +1047,7 @@
           <a:p>
             <a:fld id="{D3E71BF4-18BE-4437-9EA8-9E1F8EFE1093}" type="datetimeFigureOut">
               <a:rPr lang="en-US" smtClean="0"/>
-              <a:t>12/13/2020</a:t>
+              <a:t>3/31/2021</a:t>
             </a:fld>
             <a:endParaRPr lang="en-US"/>
           </a:p>
@@ -1225,7 +1227,7 @@
           <a:p>
             <a:fld id="{D3E71BF4-18BE-4437-9EA8-9E1F8EFE1093}" type="datetimeFigureOut">
               <a:rPr lang="en-US" smtClean="0"/>
-              <a:t>12/13/2020</a:t>
+              <a:t>3/31/2021</a:t>
             </a:fld>
             <a:endParaRPr lang="en-US"/>
           </a:p>
@@ -1395,7 +1397,7 @@
           <a:p>
             <a:fld id="{D3E71BF4-18BE-4437-9EA8-9E1F8EFE1093}" type="datetimeFigureOut">
               <a:rPr lang="en-US" smtClean="0"/>
-              <a:t>12/13/2020</a:t>
+              <a:t>3/31/2021</a:t>
             </a:fld>
             <a:endParaRPr lang="en-US"/>
           </a:p>
@@ -1653,7 +1655,7 @@
           <a:p>
             <a:fld id="{D3E71BF4-18BE-4437-9EA8-9E1F8EFE1093}" type="datetimeFigureOut">
               <a:rPr lang="en-US" smtClean="0"/>
-              <a:t>12/13/2020</a:t>
+              <a:t>3/31/2021</a:t>
             </a:fld>
             <a:endParaRPr lang="en-US"/>
           </a:p>
@@ -1941,7 +1943,7 @@
           <a:p>
             <a:fld id="{D3E71BF4-18BE-4437-9EA8-9E1F8EFE1093}" type="datetimeFigureOut">
               <a:rPr lang="en-US" smtClean="0"/>
-              <a:t>12/13/2020</a:t>
+              <a:t>3/31/2021</a:t>
             </a:fld>
             <a:endParaRPr lang="en-US"/>
           </a:p>
@@ -2383,7 +2385,7 @@
           <a:p>
             <a:fld id="{D3E71BF4-18BE-4437-9EA8-9E1F8EFE1093}" type="datetimeFigureOut">
               <a:rPr lang="en-US" smtClean="0"/>
-              <a:t>12/13/2020</a:t>
+              <a:t>3/31/2021</a:t>
             </a:fld>
             <a:endParaRPr lang="en-US"/>
           </a:p>
@@ -2501,7 +2503,7 @@
           <a:p>
             <a:fld id="{D3E71BF4-18BE-4437-9EA8-9E1F8EFE1093}" type="datetimeFigureOut">
               <a:rPr lang="en-US" smtClean="0"/>
-              <a:t>12/13/2020</a:t>
+              <a:t>3/31/2021</a:t>
             </a:fld>
             <a:endParaRPr lang="en-US"/>
           </a:p>
@@ -2596,7 +2598,7 @@
           <a:p>
             <a:fld id="{D3E71BF4-18BE-4437-9EA8-9E1F8EFE1093}" type="datetimeFigureOut">
               <a:rPr lang="en-US" smtClean="0"/>
-              <a:t>12/13/2020</a:t>
+              <a:t>3/31/2021</a:t>
             </a:fld>
             <a:endParaRPr lang="en-US"/>
           </a:p>
@@ -2884,7 +2886,7 @@
           <a:p>
             <a:fld id="{D3E71BF4-18BE-4437-9EA8-9E1F8EFE1093}" type="datetimeFigureOut">
               <a:rPr lang="en-US" smtClean="0"/>
-              <a:t>12/13/2020</a:t>
+              <a:t>3/31/2021</a:t>
             </a:fld>
             <a:endParaRPr lang="en-US"/>
           </a:p>
@@ -3157,7 +3159,7 @@
           <a:p>
             <a:fld id="{D3E71BF4-18BE-4437-9EA8-9E1F8EFE1093}" type="datetimeFigureOut">
               <a:rPr lang="en-US" smtClean="0"/>
-              <a:t>12/13/2020</a:t>
+              <a:t>3/31/2021</a:t>
             </a:fld>
             <a:endParaRPr lang="en-US"/>
           </a:p>
@@ -3454,7 +3456,7 @@
           <a:p>
             <a:fld id="{D3E71BF4-18BE-4437-9EA8-9E1F8EFE1093}" type="datetimeFigureOut">
               <a:rPr lang="en-US" smtClean="0"/>
-              <a:t>12/13/2020</a:t>
+              <a:t>3/31/2021</a:t>
             </a:fld>
             <a:endParaRPr lang="en-US"/>
           </a:p>
@@ -3979,6 +3981,153 @@
     <p:extLst>
       <p:ext uri="{BB962C8B-B14F-4D97-AF65-F5344CB8AC3E}">
         <p14:creationId xmlns:p14="http://schemas.microsoft.com/office/powerpoint/2010/main" val="4261868765"/>
+      </p:ext>
+    </p:extLst>
+  </p:cSld>
+  <p:clrMapOvr>
+    <a:masterClrMapping/>
+  </p:clrMapOvr>
+</p:sld>
+</file>
+
+<file path=ppt/slides/slide10.xml><?xml version="1.0" encoding="utf-8"?>
+<p:sld xmlns:a="http://schemas.openxmlformats.org/drawingml/2006/main" xmlns:r="http://schemas.openxmlformats.org/officeDocument/2006/relationships" xmlns:p="http://schemas.openxmlformats.org/presentationml/2006/main">
+  <p:cSld>
+    <p:spTree>
+      <p:nvGrpSpPr>
+        <p:cNvPr id="1" name=""/>
+        <p:cNvGrpSpPr/>
+        <p:nvPr/>
+      </p:nvGrpSpPr>
+      <p:grpSpPr>
+        <a:xfrm>
+          <a:off x="0" y="0"/>
+          <a:ext cx="0" cy="0"/>
+          <a:chOff x="0" y="0"/>
+          <a:chExt cx="0" cy="0"/>
+        </a:xfrm>
+      </p:grpSpPr>
+      <p:grpSp>
+        <p:nvGrpSpPr>
+          <p:cNvPr id="5" name="Group 4">
+            <a:extLst>
+              <a:ext uri="{FF2B5EF4-FFF2-40B4-BE49-F238E27FC236}">
+                <a16:creationId xmlns:a16="http://schemas.microsoft.com/office/drawing/2014/main" id="{C21ABCC3-F20D-4AC7-B06A-24F61396DE17}"/>
+              </a:ext>
+            </a:extLst>
+          </p:cNvPr>
+          <p:cNvGrpSpPr/>
+          <p:nvPr/>
+        </p:nvGrpSpPr>
+        <p:grpSpPr>
+          <a:xfrm>
+            <a:off x="3570249" y="1194683"/>
+            <a:ext cx="5943600" cy="4245610"/>
+            <a:chOff x="3124200" y="1306195"/>
+            <a:chExt cx="5943600" cy="4245610"/>
+          </a:xfrm>
+        </p:grpSpPr>
+        <p:pic>
+          <p:nvPicPr>
+            <p:cNvPr id="2" name="Picture 1">
+              <a:extLst>
+                <a:ext uri="{FF2B5EF4-FFF2-40B4-BE49-F238E27FC236}">
+                  <a16:creationId xmlns:a16="http://schemas.microsoft.com/office/drawing/2014/main" id="{8B75343D-33C4-4771-83C2-BBE02300D555}"/>
+                </a:ext>
+              </a:extLst>
+            </p:cNvPr>
+            <p:cNvPicPr/>
+            <p:nvPr/>
+          </p:nvPicPr>
+          <p:blipFill>
+            <a:blip r:embed="rId2" cstate="print">
+              <a:extLst>
+                <a:ext uri="{28A0092B-C50C-407E-A947-70E740481C1C}">
+                  <a14:useLocalDpi xmlns:a14="http://schemas.microsoft.com/office/drawing/2010/main" val="0"/>
+                </a:ext>
+              </a:extLst>
+            </a:blip>
+            <a:srcRect/>
+            <a:stretch>
+              <a:fillRect/>
+            </a:stretch>
+          </p:blipFill>
+          <p:spPr bwMode="auto">
+            <a:xfrm>
+              <a:off x="3124200" y="1306195"/>
+              <a:ext cx="5943600" cy="4245610"/>
+            </a:xfrm>
+            <a:prstGeom prst="rect">
+              <a:avLst/>
+            </a:prstGeom>
+            <a:noFill/>
+            <a:ln>
+              <a:noFill/>
+            </a:ln>
+          </p:spPr>
+        </p:pic>
+        <p:sp>
+          <p:nvSpPr>
+            <p:cNvPr id="3" name="TextBox 2">
+              <a:extLst>
+                <a:ext uri="{FF2B5EF4-FFF2-40B4-BE49-F238E27FC236}">
+                  <a16:creationId xmlns:a16="http://schemas.microsoft.com/office/drawing/2014/main" id="{A47AE731-8A6D-4132-997A-D4AE9F334ACD}"/>
+                </a:ext>
+              </a:extLst>
+            </p:cNvPr>
+            <p:cNvSpPr txBox="1"/>
+            <p:nvPr/>
+          </p:nvSpPr>
+          <p:spPr>
+            <a:xfrm>
+              <a:off x="7064502" y="1603744"/>
+              <a:ext cx="615150" cy="246220"/>
+            </a:xfrm>
+            <a:prstGeom prst="rect">
+              <a:avLst/>
+            </a:prstGeom>
+            <a:noFill/>
+          </p:spPr>
+          <p:txBody>
+            <a:bodyPr wrap="square" rtlCol="0">
+              <a:spAutoFit/>
+            </a:bodyPr>
+            <a:lstStyle/>
+            <a:p>
+              <a:r>
+                <a:rPr lang="en-US" sz="1000" i="1" dirty="0">
+                  <a:solidFill>
+                    <a:schemeClr val="tx1">
+                      <a:lumMod val="95000"/>
+                      <a:lumOff val="5000"/>
+                    </a:schemeClr>
+                  </a:solidFill>
+                  <a:latin typeface="Arial" panose="020B0604020202020204" pitchFamily="34" charset="0"/>
+                  <a:cs typeface="Arial" panose="020B0604020202020204" pitchFamily="34" charset="0"/>
+                </a:rPr>
+                <a:t>r</a:t>
+              </a:r>
+              <a:r>
+                <a:rPr lang="en-US" sz="1000" dirty="0">
+                  <a:solidFill>
+                    <a:schemeClr val="tx1">
+                      <a:lumMod val="95000"/>
+                      <a:lumOff val="5000"/>
+                    </a:schemeClr>
+                  </a:solidFill>
+                  <a:latin typeface="Arial" panose="020B0604020202020204" pitchFamily="34" charset="0"/>
+                  <a:cs typeface="Arial" panose="020B0604020202020204" pitchFamily="34" charset="0"/>
+                </a:rPr>
+                <a:t> = 0.88</a:t>
+              </a:r>
+            </a:p>
+          </p:txBody>
+        </p:sp>
+      </p:grpSp>
+    </p:spTree>
+    <p:extLst>
+      <p:ext uri="{BB962C8B-B14F-4D97-AF65-F5344CB8AC3E}">
+        <p14:creationId xmlns:p14="http://schemas.microsoft.com/office/powerpoint/2010/main" val="974865184"/>
       </p:ext>
     </p:extLst>
   </p:cSld>
@@ -6088,6 +6237,324 @@
     <p:extLst>
       <p:ext uri="{BB962C8B-B14F-4D97-AF65-F5344CB8AC3E}">
         <p14:creationId xmlns:p14="http://schemas.microsoft.com/office/powerpoint/2010/main" val="3945243987"/>
+      </p:ext>
+    </p:extLst>
+  </p:cSld>
+  <p:clrMapOvr>
+    <a:masterClrMapping/>
+  </p:clrMapOvr>
+</p:sld>
+</file>
+
+<file path=ppt/slides/slide9.xml><?xml version="1.0" encoding="utf-8"?>
+<p:sld xmlns:a="http://schemas.openxmlformats.org/drawingml/2006/main" xmlns:r="http://schemas.openxmlformats.org/officeDocument/2006/relationships" xmlns:p="http://schemas.openxmlformats.org/presentationml/2006/main">
+  <p:cSld>
+    <p:spTree>
+      <p:nvGrpSpPr>
+        <p:cNvPr id="1" name=""/>
+        <p:cNvGrpSpPr/>
+        <p:nvPr/>
+      </p:nvGrpSpPr>
+      <p:grpSpPr>
+        <a:xfrm>
+          <a:off x="0" y="0"/>
+          <a:ext cx="0" cy="0"/>
+          <a:chOff x="0" y="0"/>
+          <a:chExt cx="0" cy="0"/>
+        </a:xfrm>
+      </p:grpSpPr>
+      <p:grpSp>
+        <p:nvGrpSpPr>
+          <p:cNvPr id="14" name="Group 13">
+            <a:extLst>
+              <a:ext uri="{FF2B5EF4-FFF2-40B4-BE49-F238E27FC236}">
+                <a16:creationId xmlns:a16="http://schemas.microsoft.com/office/drawing/2014/main" id="{DC3C3756-7054-4964-AE1C-BCCF65C025B1}"/>
+              </a:ext>
+            </a:extLst>
+          </p:cNvPr>
+          <p:cNvGrpSpPr/>
+          <p:nvPr/>
+        </p:nvGrpSpPr>
+        <p:grpSpPr>
+          <a:xfrm>
+            <a:off x="2165195" y="681727"/>
+            <a:ext cx="5943600" cy="4245610"/>
+            <a:chOff x="704385" y="280283"/>
+            <a:chExt cx="5943600" cy="4245610"/>
+          </a:xfrm>
+        </p:grpSpPr>
+        <p:pic>
+          <p:nvPicPr>
+            <p:cNvPr id="2" name="Picture 1">
+              <a:extLst>
+                <a:ext uri="{FF2B5EF4-FFF2-40B4-BE49-F238E27FC236}">
+                  <a16:creationId xmlns:a16="http://schemas.microsoft.com/office/drawing/2014/main" id="{57D7DE09-902E-4098-8134-FBD02FEA28AE}"/>
+                </a:ext>
+              </a:extLst>
+            </p:cNvPr>
+            <p:cNvPicPr/>
+            <p:nvPr/>
+          </p:nvPicPr>
+          <p:blipFill>
+            <a:blip r:embed="rId2" cstate="print">
+              <a:extLst>
+                <a:ext uri="{28A0092B-C50C-407E-A947-70E740481C1C}">
+                  <a14:useLocalDpi xmlns:a14="http://schemas.microsoft.com/office/drawing/2010/main" val="0"/>
+                </a:ext>
+              </a:extLst>
+            </a:blip>
+            <a:srcRect/>
+            <a:stretch>
+              <a:fillRect/>
+            </a:stretch>
+          </p:blipFill>
+          <p:spPr bwMode="auto">
+            <a:xfrm>
+              <a:off x="704385" y="280283"/>
+              <a:ext cx="5943600" cy="4245610"/>
+            </a:xfrm>
+            <a:prstGeom prst="rect">
+              <a:avLst/>
+            </a:prstGeom>
+            <a:noFill/>
+            <a:ln>
+              <a:noFill/>
+            </a:ln>
+          </p:spPr>
+        </p:pic>
+        <p:sp>
+          <p:nvSpPr>
+            <p:cNvPr id="6" name="TextBox 5">
+              <a:extLst>
+                <a:ext uri="{FF2B5EF4-FFF2-40B4-BE49-F238E27FC236}">
+                  <a16:creationId xmlns:a16="http://schemas.microsoft.com/office/drawing/2014/main" id="{D0BD7FCB-6257-4827-8DB9-70BA6A79DBB3}"/>
+                </a:ext>
+              </a:extLst>
+            </p:cNvPr>
+            <p:cNvSpPr txBox="1"/>
+            <p:nvPr/>
+          </p:nvSpPr>
+          <p:spPr>
+            <a:xfrm>
+              <a:off x="2674510" y="789705"/>
+              <a:ext cx="615150" cy="246220"/>
+            </a:xfrm>
+            <a:prstGeom prst="rect">
+              <a:avLst/>
+            </a:prstGeom>
+            <a:noFill/>
+          </p:spPr>
+          <p:txBody>
+            <a:bodyPr wrap="square" rtlCol="0">
+              <a:spAutoFit/>
+            </a:bodyPr>
+            <a:lstStyle/>
+            <a:p>
+              <a:r>
+                <a:rPr lang="en-US" sz="1000" i="1" dirty="0">
+                  <a:solidFill>
+                    <a:schemeClr val="tx1">
+                      <a:lumMod val="95000"/>
+                      <a:lumOff val="5000"/>
+                    </a:schemeClr>
+                  </a:solidFill>
+                  <a:latin typeface="Arial" panose="020B0604020202020204" pitchFamily="34" charset="0"/>
+                  <a:cs typeface="Arial" panose="020B0604020202020204" pitchFamily="34" charset="0"/>
+                </a:rPr>
+                <a:t>r</a:t>
+              </a:r>
+              <a:r>
+                <a:rPr lang="en-US" sz="1000" dirty="0">
+                  <a:solidFill>
+                    <a:schemeClr val="tx1">
+                      <a:lumMod val="95000"/>
+                      <a:lumOff val="5000"/>
+                    </a:schemeClr>
+                  </a:solidFill>
+                  <a:latin typeface="Arial" panose="020B0604020202020204" pitchFamily="34" charset="0"/>
+                  <a:cs typeface="Arial" panose="020B0604020202020204" pitchFamily="34" charset="0"/>
+                </a:rPr>
+                <a:t> = 0.97</a:t>
+              </a:r>
+            </a:p>
+          </p:txBody>
+        </p:sp>
+        <p:sp>
+          <p:nvSpPr>
+            <p:cNvPr id="9" name="TextBox 8">
+              <a:extLst>
+                <a:ext uri="{FF2B5EF4-FFF2-40B4-BE49-F238E27FC236}">
+                  <a16:creationId xmlns:a16="http://schemas.microsoft.com/office/drawing/2014/main" id="{B55E5235-54A4-4FDF-BA18-96308A6450DA}"/>
+                </a:ext>
+              </a:extLst>
+            </p:cNvPr>
+            <p:cNvSpPr txBox="1"/>
+            <p:nvPr/>
+          </p:nvSpPr>
+          <p:spPr>
+            <a:xfrm>
+              <a:off x="4778500" y="2628793"/>
+              <a:ext cx="615150" cy="246220"/>
+            </a:xfrm>
+            <a:prstGeom prst="rect">
+              <a:avLst/>
+            </a:prstGeom>
+            <a:noFill/>
+          </p:spPr>
+          <p:txBody>
+            <a:bodyPr wrap="square" rtlCol="0">
+              <a:spAutoFit/>
+            </a:bodyPr>
+            <a:lstStyle/>
+            <a:p>
+              <a:r>
+                <a:rPr lang="en-US" sz="1000" i="1" dirty="0">
+                  <a:solidFill>
+                    <a:schemeClr val="tx1">
+                      <a:lumMod val="95000"/>
+                      <a:lumOff val="5000"/>
+                    </a:schemeClr>
+                  </a:solidFill>
+                  <a:latin typeface="Arial" panose="020B0604020202020204" pitchFamily="34" charset="0"/>
+                  <a:cs typeface="Arial" panose="020B0604020202020204" pitchFamily="34" charset="0"/>
+                </a:rPr>
+                <a:t>r</a:t>
+              </a:r>
+              <a:r>
+                <a:rPr lang="en-US" sz="1000" dirty="0">
+                  <a:solidFill>
+                    <a:schemeClr val="tx1">
+                      <a:lumMod val="95000"/>
+                      <a:lumOff val="5000"/>
+                    </a:schemeClr>
+                  </a:solidFill>
+                  <a:latin typeface="Arial" panose="020B0604020202020204" pitchFamily="34" charset="0"/>
+                  <a:cs typeface="Arial" panose="020B0604020202020204" pitchFamily="34" charset="0"/>
+                </a:rPr>
+                <a:t> = 0.85</a:t>
+              </a:r>
+            </a:p>
+          </p:txBody>
+        </p:sp>
+        <p:sp>
+          <p:nvSpPr>
+            <p:cNvPr id="12" name="TextBox 11">
+              <a:extLst>
+                <a:ext uri="{FF2B5EF4-FFF2-40B4-BE49-F238E27FC236}">
+                  <a16:creationId xmlns:a16="http://schemas.microsoft.com/office/drawing/2014/main" id="{368E3116-DD76-451D-9D60-03F7F7A5F4C1}"/>
+                </a:ext>
+              </a:extLst>
+            </p:cNvPr>
+            <p:cNvSpPr txBox="1"/>
+            <p:nvPr/>
+          </p:nvSpPr>
+          <p:spPr>
+            <a:xfrm>
+              <a:off x="2674510" y="2628793"/>
+              <a:ext cx="615150" cy="246220"/>
+            </a:xfrm>
+            <a:prstGeom prst="rect">
+              <a:avLst/>
+            </a:prstGeom>
+            <a:noFill/>
+          </p:spPr>
+          <p:txBody>
+            <a:bodyPr wrap="square" rtlCol="0">
+              <a:spAutoFit/>
+            </a:bodyPr>
+            <a:lstStyle/>
+            <a:p>
+              <a:r>
+                <a:rPr lang="en-US" sz="1000" i="1" dirty="0">
+                  <a:solidFill>
+                    <a:schemeClr val="tx1">
+                      <a:lumMod val="95000"/>
+                      <a:lumOff val="5000"/>
+                    </a:schemeClr>
+                  </a:solidFill>
+                  <a:latin typeface="Arial" panose="020B0604020202020204" pitchFamily="34" charset="0"/>
+                  <a:cs typeface="Arial" panose="020B0604020202020204" pitchFamily="34" charset="0"/>
+                </a:rPr>
+                <a:t>r</a:t>
+              </a:r>
+              <a:r>
+                <a:rPr lang="en-US" sz="1000" dirty="0">
+                  <a:solidFill>
+                    <a:schemeClr val="tx1">
+                      <a:lumMod val="95000"/>
+                      <a:lumOff val="5000"/>
+                    </a:schemeClr>
+                  </a:solidFill>
+                  <a:latin typeface="Arial" panose="020B0604020202020204" pitchFamily="34" charset="0"/>
+                  <a:cs typeface="Arial" panose="020B0604020202020204" pitchFamily="34" charset="0"/>
+                </a:rPr>
+                <a:t> = 0.86</a:t>
+              </a:r>
+            </a:p>
+          </p:txBody>
+        </p:sp>
+        <p:sp>
+          <p:nvSpPr>
+            <p:cNvPr id="13" name="TextBox 12">
+              <a:extLst>
+                <a:ext uri="{FF2B5EF4-FFF2-40B4-BE49-F238E27FC236}">
+                  <a16:creationId xmlns:a16="http://schemas.microsoft.com/office/drawing/2014/main" id="{47183BF9-3414-45CC-9D68-C124077994CC}"/>
+                </a:ext>
+              </a:extLst>
+            </p:cNvPr>
+            <p:cNvSpPr txBox="1"/>
+            <p:nvPr/>
+          </p:nvSpPr>
+          <p:spPr>
+            <a:xfrm>
+              <a:off x="4778500" y="789705"/>
+              <a:ext cx="615150" cy="246220"/>
+            </a:xfrm>
+            <a:prstGeom prst="rect">
+              <a:avLst/>
+            </a:prstGeom>
+            <a:noFill/>
+          </p:spPr>
+          <p:txBody>
+            <a:bodyPr wrap="square" rtlCol="0">
+              <a:spAutoFit/>
+            </a:bodyPr>
+            <a:lstStyle/>
+            <a:p>
+              <a:r>
+                <a:rPr lang="en-US" sz="1000" i="1" dirty="0">
+                  <a:solidFill>
+                    <a:schemeClr val="tx1">
+                      <a:lumMod val="95000"/>
+                      <a:lumOff val="5000"/>
+                    </a:schemeClr>
+                  </a:solidFill>
+                  <a:latin typeface="Arial" panose="020B0604020202020204" pitchFamily="34" charset="0"/>
+                  <a:cs typeface="Arial" panose="020B0604020202020204" pitchFamily="34" charset="0"/>
+                </a:rPr>
+                <a:t>r</a:t>
+              </a:r>
+              <a:r>
+                <a:rPr lang="en-US" sz="1000" dirty="0">
+                  <a:solidFill>
+                    <a:schemeClr val="tx1">
+                      <a:lumMod val="95000"/>
+                      <a:lumOff val="5000"/>
+                    </a:schemeClr>
+                  </a:solidFill>
+                  <a:latin typeface="Arial" panose="020B0604020202020204" pitchFamily="34" charset="0"/>
+                  <a:cs typeface="Arial" panose="020B0604020202020204" pitchFamily="34" charset="0"/>
+                </a:rPr>
+                <a:t> = 0.91</a:t>
+              </a:r>
+            </a:p>
+          </p:txBody>
+        </p:sp>
+      </p:grpSp>
+    </p:spTree>
+    <p:extLst>
+      <p:ext uri="{BB962C8B-B14F-4D97-AF65-F5344CB8AC3E}">
+        <p14:creationId xmlns:p14="http://schemas.microsoft.com/office/powerpoint/2010/main" val="1040602139"/>
       </p:ext>
     </p:extLst>
   </p:cSld>

</xml_diff>